<commit_message>
created lots of visualizations
</commit_message>
<xml_diff>
--- a/visualizations/visualizations.pptx
+++ b/visualizations/visualizations.pptx
@@ -9,6 +9,7 @@
     <p:sldId id="260" r:id="rId3"/>
     <p:sldId id="261" r:id="rId4"/>
     <p:sldId id="262" r:id="rId5"/>
+    <p:sldId id="263" r:id="rId6"/>
   </p:sldIdLst>
   <p:sldSz cx="12192000" cy="6858000"/>
   <p:notesSz cx="6858000" cy="9144000"/>
@@ -262,7 +263,7 @@
           <a:p>
             <a:fld id="{02DE1A39-6B7C-1C41-B748-86E8CB4FA6E7}" type="datetimeFigureOut">
               <a:rPr lang="en-US" smtClean="0"/>
-              <a:t>3/13/25</a:t>
+              <a:t>3/18/25</a:t>
             </a:fld>
             <a:endParaRPr lang="en-US"/>
           </a:p>
@@ -460,7 +461,7 @@
           <a:p>
             <a:fld id="{02DE1A39-6B7C-1C41-B748-86E8CB4FA6E7}" type="datetimeFigureOut">
               <a:rPr lang="en-US" smtClean="0"/>
-              <a:t>3/13/25</a:t>
+              <a:t>3/18/25</a:t>
             </a:fld>
             <a:endParaRPr lang="en-US"/>
           </a:p>
@@ -668,7 +669,7 @@
           <a:p>
             <a:fld id="{02DE1A39-6B7C-1C41-B748-86E8CB4FA6E7}" type="datetimeFigureOut">
               <a:rPr lang="en-US" smtClean="0"/>
-              <a:t>3/13/25</a:t>
+              <a:t>3/18/25</a:t>
             </a:fld>
             <a:endParaRPr lang="en-US"/>
           </a:p>
@@ -866,7 +867,7 @@
           <a:p>
             <a:fld id="{02DE1A39-6B7C-1C41-B748-86E8CB4FA6E7}" type="datetimeFigureOut">
               <a:rPr lang="en-US" smtClean="0"/>
-              <a:t>3/13/25</a:t>
+              <a:t>3/18/25</a:t>
             </a:fld>
             <a:endParaRPr lang="en-US"/>
           </a:p>
@@ -1141,7 +1142,7 @@
           <a:p>
             <a:fld id="{02DE1A39-6B7C-1C41-B748-86E8CB4FA6E7}" type="datetimeFigureOut">
               <a:rPr lang="en-US" smtClean="0"/>
-              <a:t>3/13/25</a:t>
+              <a:t>3/18/25</a:t>
             </a:fld>
             <a:endParaRPr lang="en-US"/>
           </a:p>
@@ -1406,7 +1407,7 @@
           <a:p>
             <a:fld id="{02DE1A39-6B7C-1C41-B748-86E8CB4FA6E7}" type="datetimeFigureOut">
               <a:rPr lang="en-US" smtClean="0"/>
-              <a:t>3/13/25</a:t>
+              <a:t>3/18/25</a:t>
             </a:fld>
             <a:endParaRPr lang="en-US"/>
           </a:p>
@@ -1818,7 +1819,7 @@
           <a:p>
             <a:fld id="{02DE1A39-6B7C-1C41-B748-86E8CB4FA6E7}" type="datetimeFigureOut">
               <a:rPr lang="en-US" smtClean="0"/>
-              <a:t>3/13/25</a:t>
+              <a:t>3/18/25</a:t>
             </a:fld>
             <a:endParaRPr lang="en-US"/>
           </a:p>
@@ -1959,7 +1960,7 @@
           <a:p>
             <a:fld id="{02DE1A39-6B7C-1C41-B748-86E8CB4FA6E7}" type="datetimeFigureOut">
               <a:rPr lang="en-US" smtClean="0"/>
-              <a:t>3/13/25</a:t>
+              <a:t>3/18/25</a:t>
             </a:fld>
             <a:endParaRPr lang="en-US"/>
           </a:p>
@@ -2072,7 +2073,7 @@
           <a:p>
             <a:fld id="{02DE1A39-6B7C-1C41-B748-86E8CB4FA6E7}" type="datetimeFigureOut">
               <a:rPr lang="en-US" smtClean="0"/>
-              <a:t>3/13/25</a:t>
+              <a:t>3/18/25</a:t>
             </a:fld>
             <a:endParaRPr lang="en-US"/>
           </a:p>
@@ -2383,7 +2384,7 @@
           <a:p>
             <a:fld id="{02DE1A39-6B7C-1C41-B748-86E8CB4FA6E7}" type="datetimeFigureOut">
               <a:rPr lang="en-US" smtClean="0"/>
-              <a:t>3/13/25</a:t>
+              <a:t>3/18/25</a:t>
             </a:fld>
             <a:endParaRPr lang="en-US"/>
           </a:p>
@@ -2671,7 +2672,7 @@
           <a:p>
             <a:fld id="{02DE1A39-6B7C-1C41-B748-86E8CB4FA6E7}" type="datetimeFigureOut">
               <a:rPr lang="en-US" smtClean="0"/>
-              <a:t>3/13/25</a:t>
+              <a:t>3/18/25</a:t>
             </a:fld>
             <a:endParaRPr lang="en-US"/>
           </a:p>
@@ -2912,7 +2913,7 @@
           <a:p>
             <a:fld id="{02DE1A39-6B7C-1C41-B748-86E8CB4FA6E7}" type="datetimeFigureOut">
               <a:rPr lang="en-US" smtClean="0"/>
-              <a:t>3/13/25</a:t>
+              <a:t>3/18/25</a:t>
             </a:fld>
             <a:endParaRPr lang="en-US"/>
           </a:p>
@@ -3739,10 +3740,10 @@
       </p:grpSpPr>
       <p:grpSp>
         <p:nvGrpSpPr>
-          <p:cNvPr id="44" name="Group 43">
-            <a:extLst>
-              <a:ext uri="{FF2B5EF4-FFF2-40B4-BE49-F238E27FC236}">
-                <a16:creationId xmlns:a16="http://schemas.microsoft.com/office/drawing/2014/main" id="{7FBE35F4-4898-C03B-6473-665AB2891ADA}"/>
+          <p:cNvPr id="12" name="Group 11">
+            <a:extLst>
+              <a:ext uri="{FF2B5EF4-FFF2-40B4-BE49-F238E27FC236}">
+                <a16:creationId xmlns:a16="http://schemas.microsoft.com/office/drawing/2014/main" id="{0FDF6EA1-CD9C-1243-737E-3AFBB4579AF3}"/>
               </a:ext>
             </a:extLst>
           </p:cNvPr>
@@ -3751,18 +3752,18 @@
         </p:nvGrpSpPr>
         <p:grpSpPr>
           <a:xfrm>
-            <a:off x="843671" y="584200"/>
+            <a:off x="970622" y="734200"/>
             <a:ext cx="11049000" cy="2844800"/>
-            <a:chOff x="843671" y="584200"/>
+            <a:chOff x="970622" y="734200"/>
             <a:chExt cx="11049000" cy="2844800"/>
           </a:xfrm>
         </p:grpSpPr>
         <p:pic>
           <p:nvPicPr>
-            <p:cNvPr id="25" name="Picture 24" descr="A graph of different colored bars&#10;&#10;AI-generated content may be incorrect.">
+            <p:cNvPr id="3" name="Picture 2" descr="A graph of blue bars&#10;&#10;AI-generated content may be incorrect.">
               <a:extLst>
                 <a:ext uri="{FF2B5EF4-FFF2-40B4-BE49-F238E27FC236}">
-                  <a16:creationId xmlns:a16="http://schemas.microsoft.com/office/drawing/2014/main" id="{C38277E3-0024-6437-8AFF-601CA8FB78C1}"/>
+                  <a16:creationId xmlns:a16="http://schemas.microsoft.com/office/drawing/2014/main" id="{F4C5CD43-C960-9041-4ACC-0A073F968216}"/>
                 </a:ext>
               </a:extLst>
             </p:cNvPr>
@@ -3779,7 +3780,7 @@
           </p:blipFill>
           <p:spPr>
             <a:xfrm>
-              <a:off x="5529971" y="584200"/>
+              <a:off x="5656922" y="734200"/>
               <a:ext cx="2120900" cy="2844800"/>
             </a:xfrm>
             <a:prstGeom prst="rect">
@@ -3789,10 +3790,10 @@
         </p:pic>
         <p:pic>
           <p:nvPicPr>
-            <p:cNvPr id="29" name="Picture 28" descr="A graph of different colored bars&#10;&#10;AI-generated content may be incorrect.">
+            <p:cNvPr id="5" name="Picture 4" descr="A graph of blue bars&#10;&#10;AI-generated content may be incorrect.">
               <a:extLst>
                 <a:ext uri="{FF2B5EF4-FFF2-40B4-BE49-F238E27FC236}">
-                  <a16:creationId xmlns:a16="http://schemas.microsoft.com/office/drawing/2014/main" id="{2454F6C1-9C3F-E103-13E0-D3A1B9865695}"/>
+                  <a16:creationId xmlns:a16="http://schemas.microsoft.com/office/drawing/2014/main" id="{9881BC8D-4852-21C4-38AE-A831EC2C5DAE}"/>
                 </a:ext>
               </a:extLst>
             </p:cNvPr>
@@ -3809,7 +3810,7 @@
           </p:blipFill>
           <p:spPr>
             <a:xfrm>
-              <a:off x="9771771" y="584200"/>
+              <a:off x="9898722" y="734200"/>
               <a:ext cx="2120900" cy="2844800"/>
             </a:xfrm>
             <a:prstGeom prst="rect">
@@ -3819,10 +3820,10 @@
         </p:pic>
         <p:pic>
           <p:nvPicPr>
-            <p:cNvPr id="34" name="Picture 33" descr="A graph of different colored bars&#10;&#10;AI-generated content may be incorrect.">
+            <p:cNvPr id="7" name="Picture 6" descr="A graph of numbers and a bar chart&#10;&#10;AI-generated content may be incorrect.">
               <a:extLst>
                 <a:ext uri="{FF2B5EF4-FFF2-40B4-BE49-F238E27FC236}">
-                  <a16:creationId xmlns:a16="http://schemas.microsoft.com/office/drawing/2014/main" id="{408E4997-E463-6079-1989-BE47D899D658}"/>
+                  <a16:creationId xmlns:a16="http://schemas.microsoft.com/office/drawing/2014/main" id="{1B03E134-70E0-F24D-BE0D-EC01C34C5C37}"/>
                 </a:ext>
               </a:extLst>
             </p:cNvPr>
@@ -3839,8 +3840,8 @@
           </p:blipFill>
           <p:spPr>
             <a:xfrm>
-              <a:off x="3409071" y="584200"/>
-              <a:ext cx="2120900" cy="2844800"/>
+              <a:off x="970622" y="734200"/>
+              <a:ext cx="2565400" cy="2844800"/>
             </a:xfrm>
             <a:prstGeom prst="rect">
               <a:avLst/>
@@ -3849,10 +3850,10 @@
         </p:pic>
         <p:pic>
           <p:nvPicPr>
-            <p:cNvPr id="36" name="Picture 35" descr="A graph of different colored bars&#10;&#10;AI-generated content may be incorrect.">
+            <p:cNvPr id="9" name="Picture 8" descr="A graph of blue bars&#10;&#10;AI-generated content may be incorrect.">
               <a:extLst>
                 <a:ext uri="{FF2B5EF4-FFF2-40B4-BE49-F238E27FC236}">
-                  <a16:creationId xmlns:a16="http://schemas.microsoft.com/office/drawing/2014/main" id="{5F664A6F-0CF1-7C56-408A-4423F09BD024}"/>
+                  <a16:creationId xmlns:a16="http://schemas.microsoft.com/office/drawing/2014/main" id="{7F3D877E-09A1-7842-508D-667531712EEB}"/>
                 </a:ext>
               </a:extLst>
             </p:cNvPr>
@@ -3869,7 +3870,7 @@
           </p:blipFill>
           <p:spPr>
             <a:xfrm>
-              <a:off x="7650871" y="584200"/>
+              <a:off x="3536022" y="734200"/>
               <a:ext cx="2120900" cy="2844800"/>
             </a:xfrm>
             <a:prstGeom prst="rect">
@@ -3879,10 +3880,10 @@
         </p:pic>
         <p:pic>
           <p:nvPicPr>
-            <p:cNvPr id="43" name="Picture 42" descr="A graph of numbers and a bar chart&#10;&#10;AI-generated content may be incorrect.">
+            <p:cNvPr id="11" name="Picture 10" descr="A graph of blue bars&#10;&#10;AI-generated content may be incorrect.">
               <a:extLst>
                 <a:ext uri="{FF2B5EF4-FFF2-40B4-BE49-F238E27FC236}">
-                  <a16:creationId xmlns:a16="http://schemas.microsoft.com/office/drawing/2014/main" id="{636F0E98-30D3-245E-EEAA-12CD5D071481}"/>
+                  <a16:creationId xmlns:a16="http://schemas.microsoft.com/office/drawing/2014/main" id="{2AB24C85-F3BB-E847-5DE2-77E06B3A11E9}"/>
                 </a:ext>
               </a:extLst>
             </p:cNvPr>
@@ -3899,8 +3900,8 @@
           </p:blipFill>
           <p:spPr>
             <a:xfrm>
-              <a:off x="843671" y="584200"/>
-              <a:ext cx="2565400" cy="2844800"/>
+              <a:off x="7777822" y="734200"/>
+              <a:ext cx="2120900" cy="2844800"/>
             </a:xfrm>
             <a:prstGeom prst="rect">
               <a:avLst/>
@@ -3946,10 +3947,10 @@
       </p:grpSpPr>
       <p:grpSp>
         <p:nvGrpSpPr>
-          <p:cNvPr id="27" name="Group 26">
-            <a:extLst>
-              <a:ext uri="{FF2B5EF4-FFF2-40B4-BE49-F238E27FC236}">
-                <a16:creationId xmlns:a16="http://schemas.microsoft.com/office/drawing/2014/main" id="{E44EFF95-D254-991F-56B3-A5C518BFD018}"/>
+          <p:cNvPr id="16" name="Group 15">
+            <a:extLst>
+              <a:ext uri="{FF2B5EF4-FFF2-40B4-BE49-F238E27FC236}">
+                <a16:creationId xmlns:a16="http://schemas.microsoft.com/office/drawing/2014/main" id="{37F0787B-FD27-EB7E-6EFA-20F226D38476}"/>
               </a:ext>
             </a:extLst>
           </p:cNvPr>
@@ -3958,18 +3959,18 @@
         </p:nvGrpSpPr>
         <p:grpSpPr>
           <a:xfrm>
-            <a:off x="349250" y="1420769"/>
+            <a:off x="363220" y="635000"/>
             <a:ext cx="11049000" cy="2540000"/>
-            <a:chOff x="349250" y="1420769"/>
+            <a:chOff x="363220" y="635000"/>
             <a:chExt cx="11049000" cy="2540000"/>
           </a:xfrm>
         </p:grpSpPr>
         <p:pic>
           <p:nvPicPr>
-            <p:cNvPr id="17" name="Picture 16" descr="A graph with numbers and a red line&#10;&#10;AI-generated content may be incorrect.">
+            <p:cNvPr id="3" name="Picture 2" descr="A graph of a number of bars&#10;&#10;AI-generated content may be incorrect.">
               <a:extLst>
                 <a:ext uri="{FF2B5EF4-FFF2-40B4-BE49-F238E27FC236}">
-                  <a16:creationId xmlns:a16="http://schemas.microsoft.com/office/drawing/2014/main" id="{448381CE-822D-4DE4-BEB5-178970B364E5}"/>
+                  <a16:creationId xmlns:a16="http://schemas.microsoft.com/office/drawing/2014/main" id="{A29A6BD5-BBE0-B4D9-3D53-6107466430BF}"/>
                 </a:ext>
               </a:extLst>
             </p:cNvPr>
@@ -3986,7 +3987,7 @@
           </p:blipFill>
           <p:spPr>
             <a:xfrm>
-              <a:off x="349250" y="1420769"/>
+              <a:off x="363220" y="635000"/>
               <a:ext cx="2565400" cy="2540000"/>
             </a:xfrm>
             <a:prstGeom prst="rect">
@@ -3996,10 +3997,10 @@
         </p:pic>
         <p:pic>
           <p:nvPicPr>
-            <p:cNvPr id="19" name="Picture 18" descr="A graph of a bar graph&#10;&#10;AI-generated content may be incorrect.">
+            <p:cNvPr id="6" name="Picture 5" descr="A graph of a number of bars&#10;&#10;AI-generated content may be incorrect.">
               <a:extLst>
                 <a:ext uri="{FF2B5EF4-FFF2-40B4-BE49-F238E27FC236}">
-                  <a16:creationId xmlns:a16="http://schemas.microsoft.com/office/drawing/2014/main" id="{87DD8E9F-6D62-7706-E1C3-F6684CADD4BA}"/>
+                  <a16:creationId xmlns:a16="http://schemas.microsoft.com/office/drawing/2014/main" id="{C4C525BE-5414-38E7-5F5C-F837AC7E5C71}"/>
                 </a:ext>
               </a:extLst>
             </p:cNvPr>
@@ -4016,7 +4017,7 @@
           </p:blipFill>
           <p:spPr>
             <a:xfrm>
-              <a:off x="2914650" y="1448383"/>
+              <a:off x="2928620" y="673100"/>
               <a:ext cx="2120900" cy="2501900"/>
             </a:xfrm>
             <a:prstGeom prst="rect">
@@ -4026,10 +4027,10 @@
         </p:pic>
         <p:pic>
           <p:nvPicPr>
-            <p:cNvPr id="21" name="Picture 20" descr="A graph of a bar graph&#10;&#10;AI-generated content may be incorrect.">
+            <p:cNvPr id="9" name="Picture 8" descr="A graph of a number of columns&#10;&#10;AI-generated content may be incorrect.">
               <a:extLst>
                 <a:ext uri="{FF2B5EF4-FFF2-40B4-BE49-F238E27FC236}">
-                  <a16:creationId xmlns:a16="http://schemas.microsoft.com/office/drawing/2014/main" id="{16FCBC20-5C12-967D-5939-654BD16062DF}"/>
+                  <a16:creationId xmlns:a16="http://schemas.microsoft.com/office/drawing/2014/main" id="{5BBBBF50-1971-50BD-1AA4-22640DFE5B44}"/>
                 </a:ext>
               </a:extLst>
             </p:cNvPr>
@@ -4046,7 +4047,7 @@
           </p:blipFill>
           <p:spPr>
             <a:xfrm>
-              <a:off x="7156450" y="1458869"/>
+              <a:off x="5049520" y="673100"/>
               <a:ext cx="2120900" cy="2501900"/>
             </a:xfrm>
             <a:prstGeom prst="rect">
@@ -4056,10 +4057,10 @@
         </p:pic>
         <p:pic>
           <p:nvPicPr>
-            <p:cNvPr id="23" name="Picture 22" descr="A graph of a bar graph&#10;&#10;AI-generated content may be incorrect.">
+            <p:cNvPr id="11" name="Picture 10" descr="A graph of a number of bars&#10;&#10;AI-generated content may be incorrect.">
               <a:extLst>
                 <a:ext uri="{FF2B5EF4-FFF2-40B4-BE49-F238E27FC236}">
-                  <a16:creationId xmlns:a16="http://schemas.microsoft.com/office/drawing/2014/main" id="{23103AA0-1CAF-A4D9-0498-2ABD4F7938A9}"/>
+                  <a16:creationId xmlns:a16="http://schemas.microsoft.com/office/drawing/2014/main" id="{10CABAF5-2A39-10C0-E87B-B202551BAE37}"/>
                 </a:ext>
               </a:extLst>
             </p:cNvPr>
@@ -4076,7 +4077,7 @@
           </p:blipFill>
           <p:spPr>
             <a:xfrm>
-              <a:off x="5035550" y="1448383"/>
+              <a:off x="7170420" y="673100"/>
               <a:ext cx="2120900" cy="2501900"/>
             </a:xfrm>
             <a:prstGeom prst="rect">
@@ -4086,10 +4087,10 @@
         </p:pic>
         <p:pic>
           <p:nvPicPr>
-            <p:cNvPr id="26" name="Picture 25" descr="A graph of a bar chart&#10;&#10;AI-generated content may be incorrect.">
+            <p:cNvPr id="14" name="Picture 13" descr="A graph of a number of bars&#10;&#10;AI-generated content may be incorrect.">
               <a:extLst>
                 <a:ext uri="{FF2B5EF4-FFF2-40B4-BE49-F238E27FC236}">
-                  <a16:creationId xmlns:a16="http://schemas.microsoft.com/office/drawing/2014/main" id="{BCDD8916-7DB9-BAA8-8B4A-B9FA21FE5838}"/>
+                  <a16:creationId xmlns:a16="http://schemas.microsoft.com/office/drawing/2014/main" id="{0B66AF3F-EBD3-A9E6-0DF9-6C4C172BE525}"/>
                 </a:ext>
               </a:extLst>
             </p:cNvPr>
@@ -4106,7 +4107,7 @@
           </p:blipFill>
           <p:spPr>
             <a:xfrm>
-              <a:off x="9277350" y="1458869"/>
+              <a:off x="9291320" y="673100"/>
               <a:ext cx="2120900" cy="2501900"/>
             </a:xfrm>
             <a:prstGeom prst="rect">
@@ -4119,6 +4120,609 @@
     <p:extLst>
       <p:ext uri="{BB962C8B-B14F-4D97-AF65-F5344CB8AC3E}">
         <p14:creationId xmlns:p14="http://schemas.microsoft.com/office/powerpoint/2010/main" val="177935117"/>
+      </p:ext>
+    </p:extLst>
+  </p:cSld>
+  <p:clrMapOvr>
+    <a:masterClrMapping/>
+  </p:clrMapOvr>
+</p:sld>
+</file>
+
+<file path=ppt/slides/slide5.xml><?xml version="1.0" encoding="utf-8"?>
+<p:sld xmlns:a="http://schemas.openxmlformats.org/drawingml/2006/main" xmlns:r="http://schemas.openxmlformats.org/officeDocument/2006/relationships" xmlns:p="http://schemas.openxmlformats.org/presentationml/2006/main">
+  <p:cSld>
+    <p:spTree>
+      <p:nvGrpSpPr>
+        <p:cNvPr id="1" name=""/>
+        <p:cNvGrpSpPr/>
+        <p:nvPr/>
+      </p:nvGrpSpPr>
+      <p:grpSpPr>
+        <a:xfrm>
+          <a:off x="0" y="0"/>
+          <a:ext cx="0" cy="0"/>
+          <a:chOff x="0" y="0"/>
+          <a:chExt cx="0" cy="0"/>
+        </a:xfrm>
+      </p:grpSpPr>
+      <p:grpSp>
+        <p:nvGrpSpPr>
+          <p:cNvPr id="25" name="Group 24">
+            <a:extLst>
+              <a:ext uri="{FF2B5EF4-FFF2-40B4-BE49-F238E27FC236}">
+                <a16:creationId xmlns:a16="http://schemas.microsoft.com/office/drawing/2014/main" id="{B0AE803F-A85E-7025-6F93-9F6EF991995B}"/>
+              </a:ext>
+            </a:extLst>
+          </p:cNvPr>
+          <p:cNvGrpSpPr/>
+          <p:nvPr/>
+        </p:nvGrpSpPr>
+        <p:grpSpPr>
+          <a:xfrm>
+            <a:off x="1395659" y="1063823"/>
+            <a:ext cx="7879477" cy="2106037"/>
+            <a:chOff x="1395659" y="1063823"/>
+            <a:chExt cx="7879477" cy="2106037"/>
+          </a:xfrm>
+        </p:grpSpPr>
+        <p:sp>
+          <p:nvSpPr>
+            <p:cNvPr id="5" name="TextBox 4">
+              <a:extLst>
+                <a:ext uri="{FF2B5EF4-FFF2-40B4-BE49-F238E27FC236}">
+                  <a16:creationId xmlns:a16="http://schemas.microsoft.com/office/drawing/2014/main" id="{6F194CB7-1F70-0B16-7A28-8C8FBD961E60}"/>
+                </a:ext>
+              </a:extLst>
+            </p:cNvPr>
+            <p:cNvSpPr txBox="1"/>
+            <p:nvPr/>
+          </p:nvSpPr>
+          <p:spPr>
+            <a:xfrm>
+              <a:off x="1395659" y="1371419"/>
+              <a:ext cx="3939739" cy="1759456"/>
+            </a:xfrm>
+            <a:prstGeom prst="rect">
+              <a:avLst/>
+            </a:prstGeom>
+            <a:solidFill>
+              <a:schemeClr val="bg1">
+                <a:lumMod val="95000"/>
+              </a:schemeClr>
+            </a:solidFill>
+          </p:spPr>
+          <p:txBody>
+            <a:bodyPr wrap="square" rtlCol="0">
+              <a:spAutoFit/>
+            </a:bodyPr>
+            <a:lstStyle/>
+            <a:p>
+              <a:r>
+                <a:rPr lang="en-US" sz="1050" b="1" i="1" dirty="0"/>
+                <a:t>### Instruction: </a:t>
+              </a:r>
+              <a:r>
+                <a:rPr lang="en-US" sz="1050" dirty="0"/>
+                <a:t>You are a helpful geospatial analysis assistant. Please determine whether the sidewalk runs alongside the road.</a:t>
+              </a:r>
+            </a:p>
+            <a:p>
+              <a:endParaRPr lang="en-US" sz="1050" dirty="0"/>
+            </a:p>
+            <a:p>
+              <a:r>
+                <a:rPr lang="en-US" sz="1050" b="1" i="1" dirty="0"/>
+                <a:t>### User:</a:t>
+              </a:r>
+            </a:p>
+            <a:p>
+              <a:r>
+                <a:rPr lang="en-US" sz="1050" dirty="0"/>
+                <a:t>Sidewalk: {'coordinates': [[-122.2, 47.5], [-122.1, 47.5]]}</a:t>
+              </a:r>
+            </a:p>
+            <a:p>
+              <a:pPr>
+                <a:spcAft>
+                  <a:spcPts val="400"/>
+                </a:spcAft>
+              </a:pPr>
+              <a:r>
+                <a:rPr lang="en-US" sz="1050" dirty="0"/>
+                <a:t>Road: {'coordinates': [[-122.5, 47.2],  [-122.5, 47.2]]}</a:t>
+              </a:r>
+            </a:p>
+            <a:p>
+              <a:endParaRPr lang="en-US" sz="1050" dirty="0"/>
+            </a:p>
+            <a:p>
+              <a:endParaRPr lang="en-US" sz="1050" dirty="0"/>
+            </a:p>
+            <a:p>
+              <a:endParaRPr lang="en-US" sz="1050" dirty="0"/>
+            </a:p>
+            <a:p>
+              <a:r>
+                <a:rPr lang="en-US" sz="1050" b="1" i="1" dirty="0">
+                  <a:highlight>
+                    <a:srgbClr val="E30202"/>
+                  </a:highlight>
+                </a:rPr>
+                <a:t>### Response: 0</a:t>
+              </a:r>
+            </a:p>
+          </p:txBody>
+        </p:sp>
+        <p:sp>
+          <p:nvSpPr>
+            <p:cNvPr id="7" name="TextBox 6">
+              <a:extLst>
+                <a:ext uri="{FF2B5EF4-FFF2-40B4-BE49-F238E27FC236}">
+                  <a16:creationId xmlns:a16="http://schemas.microsoft.com/office/drawing/2014/main" id="{36A651B5-3FC1-9B2D-8D88-22EB6EF2C3D0}"/>
+                </a:ext>
+              </a:extLst>
+            </p:cNvPr>
+            <p:cNvSpPr txBox="1"/>
+            <p:nvPr/>
+          </p:nvSpPr>
+          <p:spPr>
+            <a:xfrm>
+              <a:off x="1395662" y="1063823"/>
+              <a:ext cx="3939736" cy="307777"/>
+            </a:xfrm>
+            <a:prstGeom prst="rect">
+              <a:avLst/>
+            </a:prstGeom>
+            <a:solidFill>
+              <a:schemeClr val="bg1">
+                <a:lumMod val="75000"/>
+              </a:schemeClr>
+            </a:solidFill>
+          </p:spPr>
+          <p:txBody>
+            <a:bodyPr wrap="square" rtlCol="0">
+              <a:spAutoFit/>
+            </a:bodyPr>
+            <a:lstStyle/>
+            <a:p>
+              <a:pPr algn="ctr"/>
+              <a:r>
+                <a:rPr lang="en-US" sz="1400" b="1" dirty="0">
+                  <a:latin typeface="Chalkboard SE Light" panose="03050602040202020205" pitchFamily="66" charset="77"/>
+                </a:rPr>
+                <a:t>Plain Prompting</a:t>
+              </a:r>
+              <a:endParaRPr lang="en-US" sz="1400" dirty="0">
+                <a:latin typeface="Chalkboard SE Light" panose="03050602040202020205" pitchFamily="66" charset="77"/>
+              </a:endParaRPr>
+            </a:p>
+          </p:txBody>
+        </p:sp>
+        <p:sp>
+          <p:nvSpPr>
+            <p:cNvPr id="13" name="TextBox 12">
+              <a:extLst>
+                <a:ext uri="{FF2B5EF4-FFF2-40B4-BE49-F238E27FC236}">
+                  <a16:creationId xmlns:a16="http://schemas.microsoft.com/office/drawing/2014/main" id="{87EC3407-1BFC-7350-CFFE-21AC60F56B98}"/>
+                </a:ext>
+              </a:extLst>
+            </p:cNvPr>
+            <p:cNvSpPr txBox="1"/>
+            <p:nvPr/>
+          </p:nvSpPr>
+          <p:spPr>
+            <a:xfrm>
+              <a:off x="5335397" y="1371419"/>
+              <a:ext cx="3939739" cy="1759456"/>
+            </a:xfrm>
+            <a:prstGeom prst="rect">
+              <a:avLst/>
+            </a:prstGeom>
+            <a:solidFill>
+              <a:schemeClr val="bg1">
+                <a:lumMod val="95000"/>
+              </a:schemeClr>
+            </a:solidFill>
+          </p:spPr>
+          <p:txBody>
+            <a:bodyPr wrap="square" rtlCol="0">
+              <a:spAutoFit/>
+            </a:bodyPr>
+            <a:lstStyle/>
+            <a:p>
+              <a:r>
+                <a:rPr lang="en-US" sz="1050" b="1" i="1" dirty="0"/>
+                <a:t>### Instruction: </a:t>
+              </a:r>
+              <a:r>
+                <a:rPr lang="en-US" sz="1050" dirty="0"/>
+                <a:t>You are a helpful geospatial analysis assistant. Please determine whether the sidewalk runs alongside the road.</a:t>
+              </a:r>
+            </a:p>
+            <a:p>
+              <a:endParaRPr lang="en-US" sz="1050" dirty="0"/>
+            </a:p>
+            <a:p>
+              <a:r>
+                <a:rPr lang="en-US" sz="1050" b="1" i="1" dirty="0"/>
+                <a:t>### User:</a:t>
+              </a:r>
+            </a:p>
+            <a:p>
+              <a:r>
+                <a:rPr lang="en-US" sz="1050" dirty="0"/>
+                <a:t>Sidewalk: {'coordinates': [[-122.2, 47.5], [-122.1, 47.5]]}</a:t>
+              </a:r>
+            </a:p>
+            <a:p>
+              <a:pPr>
+                <a:spcAft>
+                  <a:spcPts val="400"/>
+                </a:spcAft>
+              </a:pPr>
+              <a:r>
+                <a:rPr lang="en-US" sz="1050" dirty="0"/>
+                <a:t>Road: {'coordinates': [[-122.5, 47.2],  [-122.5, 47.2]]}</a:t>
+              </a:r>
+            </a:p>
+            <a:p>
+              <a:r>
+                <a:rPr lang="en-US" sz="1050" b="1" dirty="0">
+                  <a:solidFill>
+                    <a:schemeClr val="accent3"/>
+                  </a:solidFill>
+                </a:rPr>
+                <a:t>min_angle: 9.97387</a:t>
+              </a:r>
+            </a:p>
+            <a:p>
+              <a:r>
+                <a:rPr lang="en-US" sz="1050" b="1" dirty="0">
+                  <a:solidFill>
+                    <a:schemeClr val="accent3"/>
+                  </a:solidFill>
+                </a:rPr>
+                <a:t>min_distance: 8.72605</a:t>
+              </a:r>
+            </a:p>
+            <a:p>
+              <a:endParaRPr lang="en-US" sz="1050" dirty="0"/>
+            </a:p>
+            <a:p>
+              <a:r>
+                <a:rPr lang="en-US" sz="1050" b="1" i="1" dirty="0">
+                  <a:highlight>
+                    <a:srgbClr val="008000"/>
+                  </a:highlight>
+                </a:rPr>
+                <a:t>### Response: 1</a:t>
+              </a:r>
+              <a:endParaRPr lang="en-US" sz="1050" b="1" dirty="0">
+                <a:highlight>
+                  <a:srgbClr val="008000"/>
+                </a:highlight>
+              </a:endParaRPr>
+            </a:p>
+          </p:txBody>
+        </p:sp>
+        <p:pic>
+          <p:nvPicPr>
+            <p:cNvPr id="15" name="Graphic 14" descr="Checkbox Checked with solid fill">
+              <a:extLst>
+                <a:ext uri="{FF2B5EF4-FFF2-40B4-BE49-F238E27FC236}">
+                  <a16:creationId xmlns:a16="http://schemas.microsoft.com/office/drawing/2014/main" id="{D004D70B-B1F7-44BF-E394-0497357A8349}"/>
+                </a:ext>
+              </a:extLst>
+            </p:cNvPr>
+            <p:cNvPicPr>
+              <a:picLocks noChangeAspect="1"/>
+            </p:cNvPicPr>
+            <p:nvPr/>
+          </p:nvPicPr>
+          <p:blipFill>
+            <a:blip r:embed="rId2">
+              <a:extLst>
+                <a:ext uri="{96DAC541-7B7A-43D3-8B79-37D633B846F1}">
+                  <asvg:svgBlip xmlns:asvg="http://schemas.microsoft.com/office/drawing/2016/SVG/main" r:embed="rId3"/>
+                </a:ext>
+              </a:extLst>
+            </a:blip>
+            <a:stretch>
+              <a:fillRect/>
+            </a:stretch>
+          </p:blipFill>
+          <p:spPr>
+            <a:xfrm>
+              <a:off x="6379817" y="2781150"/>
+              <a:ext cx="388710" cy="388710"/>
+            </a:xfrm>
+            <a:prstGeom prst="rect">
+              <a:avLst/>
+            </a:prstGeom>
+          </p:spPr>
+        </p:pic>
+        <p:pic>
+          <p:nvPicPr>
+            <p:cNvPr id="17" name="Graphic 16" descr="Checkbox Crossed with solid fill">
+              <a:extLst>
+                <a:ext uri="{FF2B5EF4-FFF2-40B4-BE49-F238E27FC236}">
+                  <a16:creationId xmlns:a16="http://schemas.microsoft.com/office/drawing/2014/main" id="{046E7DED-2D08-C918-4B26-692CD98DEFA1}"/>
+                </a:ext>
+              </a:extLst>
+            </p:cNvPr>
+            <p:cNvPicPr>
+              <a:picLocks noChangeAspect="1"/>
+            </p:cNvPicPr>
+            <p:nvPr/>
+          </p:nvPicPr>
+          <p:blipFill>
+            <a:blip r:embed="rId4">
+              <a:extLst>
+                <a:ext uri="{96DAC541-7B7A-43D3-8B79-37D633B846F1}">
+                  <asvg:svgBlip xmlns:asvg="http://schemas.microsoft.com/office/drawing/2016/SVG/main" r:embed="rId5"/>
+                </a:ext>
+              </a:extLst>
+            </a:blip>
+            <a:stretch>
+              <a:fillRect/>
+            </a:stretch>
+          </p:blipFill>
+          <p:spPr>
+            <a:xfrm>
+              <a:off x="2444687" y="2780136"/>
+              <a:ext cx="388716" cy="388716"/>
+            </a:xfrm>
+            <a:prstGeom prst="rect">
+              <a:avLst/>
+            </a:prstGeom>
+          </p:spPr>
+        </p:pic>
+        <p:sp>
+          <p:nvSpPr>
+            <p:cNvPr id="12" name="TextBox 11">
+              <a:extLst>
+                <a:ext uri="{FF2B5EF4-FFF2-40B4-BE49-F238E27FC236}">
+                  <a16:creationId xmlns:a16="http://schemas.microsoft.com/office/drawing/2014/main" id="{ECAB5BAB-9357-E9D6-FE77-9FC5E16CB406}"/>
+                </a:ext>
+              </a:extLst>
+            </p:cNvPr>
+            <p:cNvSpPr txBox="1"/>
+            <p:nvPr/>
+          </p:nvSpPr>
+          <p:spPr>
+            <a:xfrm>
+              <a:off x="5335398" y="1063823"/>
+              <a:ext cx="3939736" cy="307777"/>
+            </a:xfrm>
+            <a:prstGeom prst="rect">
+              <a:avLst/>
+            </a:prstGeom>
+            <a:solidFill>
+              <a:schemeClr val="bg1">
+                <a:lumMod val="75000"/>
+              </a:schemeClr>
+            </a:solidFill>
+          </p:spPr>
+          <p:txBody>
+            <a:bodyPr wrap="square" rtlCol="0">
+              <a:spAutoFit/>
+            </a:bodyPr>
+            <a:lstStyle/>
+            <a:p>
+              <a:pPr algn="ctr"/>
+              <a:r>
+                <a:rPr lang="en-US" sz="1400" b="1" dirty="0">
+                  <a:latin typeface="Chalkboard SE Light" panose="03050602040202020205" pitchFamily="66" charset="77"/>
+                </a:rPr>
+                <a:t>Heuristic-Driven Prompting</a:t>
+              </a:r>
+              <a:endParaRPr lang="en-US" sz="1400" dirty="0">
+                <a:latin typeface="Chalkboard SE Light" panose="03050602040202020205" pitchFamily="66" charset="77"/>
+              </a:endParaRPr>
+            </a:p>
+          </p:txBody>
+        </p:sp>
+        <p:sp>
+          <p:nvSpPr>
+            <p:cNvPr id="19" name="Rounded Rectangle 18">
+              <a:extLst>
+                <a:ext uri="{FF2B5EF4-FFF2-40B4-BE49-F238E27FC236}">
+                  <a16:creationId xmlns:a16="http://schemas.microsoft.com/office/drawing/2014/main" id="{9EE88B6B-27F8-7B33-F3E3-534C9EA78199}"/>
+                </a:ext>
+              </a:extLst>
+            </p:cNvPr>
+            <p:cNvSpPr/>
+            <p:nvPr/>
+          </p:nvSpPr>
+          <p:spPr>
+            <a:xfrm>
+              <a:off x="5335397" y="2403836"/>
+              <a:ext cx="1555597" cy="388710"/>
+            </a:xfrm>
+            <a:prstGeom prst="roundRect">
+              <a:avLst/>
+            </a:prstGeom>
+            <a:noFill/>
+            <a:ln w="19050">
+              <a:solidFill>
+                <a:schemeClr val="accent3"/>
+              </a:solidFill>
+              <a:prstDash val="sysDash"/>
+            </a:ln>
+          </p:spPr>
+          <p:style>
+            <a:lnRef idx="2">
+              <a:schemeClr val="accent1">
+                <a:shade val="15000"/>
+              </a:schemeClr>
+            </a:lnRef>
+            <a:fillRef idx="1">
+              <a:schemeClr val="accent1"/>
+            </a:fillRef>
+            <a:effectRef idx="0">
+              <a:schemeClr val="accent1"/>
+            </a:effectRef>
+            <a:fontRef idx="minor">
+              <a:schemeClr val="lt1"/>
+            </a:fontRef>
+          </p:style>
+          <p:txBody>
+            <a:bodyPr rtlCol="0" anchor="ctr"/>
+            <a:lstStyle/>
+            <a:p>
+              <a:pPr algn="ctr"/>
+              <a:endParaRPr lang="en-US"/>
+            </a:p>
+          </p:txBody>
+        </p:sp>
+        <p:sp>
+          <p:nvSpPr>
+            <p:cNvPr id="22" name="TextBox 21">
+              <a:extLst>
+                <a:ext uri="{FF2B5EF4-FFF2-40B4-BE49-F238E27FC236}">
+                  <a16:creationId xmlns:a16="http://schemas.microsoft.com/office/drawing/2014/main" id="{F5C8043B-88ED-6AE7-0711-8169882BFE68}"/>
+                </a:ext>
+              </a:extLst>
+            </p:cNvPr>
+            <p:cNvSpPr txBox="1"/>
+            <p:nvPr/>
+          </p:nvSpPr>
+          <p:spPr>
+            <a:xfrm>
+              <a:off x="7304968" y="2459692"/>
+              <a:ext cx="1630511" cy="276999"/>
+            </a:xfrm>
+            <a:prstGeom prst="rect">
+              <a:avLst/>
+            </a:prstGeom>
+            <a:noFill/>
+          </p:spPr>
+          <p:txBody>
+            <a:bodyPr wrap="none" rtlCol="0">
+              <a:spAutoFit/>
+            </a:bodyPr>
+            <a:lstStyle/>
+            <a:p>
+              <a:r>
+                <a:rPr lang="en-US" sz="1200" b="1" dirty="0">
+                  <a:solidFill>
+                    <a:schemeClr val="accent3"/>
+                  </a:solidFill>
+                  <a:latin typeface="Chalkboard SE Light" panose="03050602040202020205" pitchFamily="66" charset="77"/>
+                </a:rPr>
+                <a:t>Topological features</a:t>
+              </a:r>
+              <a:endParaRPr lang="en-US" sz="1200" dirty="0">
+                <a:solidFill>
+                  <a:schemeClr val="accent3"/>
+                </a:solidFill>
+              </a:endParaRPr>
+            </a:p>
+          </p:txBody>
+        </p:sp>
+        <p:sp>
+          <p:nvSpPr>
+            <p:cNvPr id="23" name="Right Arrow 22">
+              <a:extLst>
+                <a:ext uri="{FF2B5EF4-FFF2-40B4-BE49-F238E27FC236}">
+                  <a16:creationId xmlns:a16="http://schemas.microsoft.com/office/drawing/2014/main" id="{64CC58DD-D36B-A27D-1258-49D29F35C696}"/>
+                </a:ext>
+              </a:extLst>
+            </p:cNvPr>
+            <p:cNvSpPr/>
+            <p:nvPr/>
+          </p:nvSpPr>
+          <p:spPr>
+            <a:xfrm rot="10800000">
+              <a:off x="6956176" y="2518063"/>
+              <a:ext cx="348792" cy="160256"/>
+            </a:xfrm>
+            <a:prstGeom prst="rightArrow">
+              <a:avLst/>
+            </a:prstGeom>
+            <a:solidFill>
+              <a:schemeClr val="accent3"/>
+            </a:solidFill>
+            <a:ln>
+              <a:noFill/>
+            </a:ln>
+          </p:spPr>
+          <p:style>
+            <a:lnRef idx="2">
+              <a:schemeClr val="accent1">
+                <a:shade val="15000"/>
+              </a:schemeClr>
+            </a:lnRef>
+            <a:fillRef idx="1">
+              <a:schemeClr val="accent1"/>
+            </a:fillRef>
+            <a:effectRef idx="0">
+              <a:schemeClr val="accent1"/>
+            </a:effectRef>
+            <a:fontRef idx="minor">
+              <a:schemeClr val="lt1"/>
+            </a:fontRef>
+          </p:style>
+          <p:txBody>
+            <a:bodyPr rtlCol="0" anchor="ctr"/>
+            <a:lstStyle/>
+            <a:p>
+              <a:pPr algn="ctr"/>
+              <a:endParaRPr lang="en-US"/>
+            </a:p>
+          </p:txBody>
+        </p:sp>
+        <p:sp>
+          <p:nvSpPr>
+            <p:cNvPr id="24" name="TextBox 23">
+              <a:extLst>
+                <a:ext uri="{FF2B5EF4-FFF2-40B4-BE49-F238E27FC236}">
+                  <a16:creationId xmlns:a16="http://schemas.microsoft.com/office/drawing/2014/main" id="{87DC4B11-9978-82A0-630A-71FB72D65F2E}"/>
+                </a:ext>
+              </a:extLst>
+            </p:cNvPr>
+            <p:cNvSpPr txBox="1"/>
+            <p:nvPr/>
+          </p:nvSpPr>
+          <p:spPr>
+            <a:xfrm>
+              <a:off x="3110045" y="2459692"/>
+              <a:ext cx="1857240" cy="276999"/>
+            </a:xfrm>
+            <a:prstGeom prst="rect">
+              <a:avLst/>
+            </a:prstGeom>
+            <a:noFill/>
+          </p:spPr>
+          <p:txBody>
+            <a:bodyPr wrap="none" rtlCol="0">
+              <a:spAutoFit/>
+            </a:bodyPr>
+            <a:lstStyle/>
+            <a:p>
+              <a:r>
+                <a:rPr lang="en-US" sz="1200" b="1" dirty="0">
+                  <a:solidFill>
+                    <a:srgbClr val="FF0000"/>
+                  </a:solidFill>
+                  <a:latin typeface="Chalkboard SE Light" panose="03050602040202020205" pitchFamily="66" charset="77"/>
+                </a:rPr>
+                <a:t>No Topological features</a:t>
+              </a:r>
+              <a:endParaRPr lang="en-US" sz="1200" dirty="0">
+                <a:solidFill>
+                  <a:srgbClr val="FF0000"/>
+                </a:solidFill>
+              </a:endParaRPr>
+            </a:p>
+          </p:txBody>
+        </p:sp>
+      </p:grpSp>
+    </p:spTree>
+    <p:extLst>
+      <p:ext uri="{BB962C8B-B14F-4D97-AF65-F5344CB8AC3E}">
+        <p14:creationId xmlns:p14="http://schemas.microsoft.com/office/powerpoint/2010/main" val="1929400563"/>
       </p:ext>
     </p:extLst>
   </p:cSld>

</xml_diff>

<commit_message>
added traveler centric experiments
</commit_message>
<xml_diff>
--- a/visualizations/visualizations.pptx
+++ b/visualizations/visualizations.pptx
@@ -263,7 +263,7 @@
           <a:p>
             <a:fld id="{02DE1A39-6B7C-1C41-B748-86E8CB4FA6E7}" type="datetimeFigureOut">
               <a:rPr lang="en-US" smtClean="0"/>
-              <a:t>3/18/25</a:t>
+              <a:t>3/19/25</a:t>
             </a:fld>
             <a:endParaRPr lang="en-US"/>
           </a:p>
@@ -461,7 +461,7 @@
           <a:p>
             <a:fld id="{02DE1A39-6B7C-1C41-B748-86E8CB4FA6E7}" type="datetimeFigureOut">
               <a:rPr lang="en-US" smtClean="0"/>
-              <a:t>3/18/25</a:t>
+              <a:t>3/19/25</a:t>
             </a:fld>
             <a:endParaRPr lang="en-US"/>
           </a:p>
@@ -669,7 +669,7 @@
           <a:p>
             <a:fld id="{02DE1A39-6B7C-1C41-B748-86E8CB4FA6E7}" type="datetimeFigureOut">
               <a:rPr lang="en-US" smtClean="0"/>
-              <a:t>3/18/25</a:t>
+              <a:t>3/19/25</a:t>
             </a:fld>
             <a:endParaRPr lang="en-US"/>
           </a:p>
@@ -867,7 +867,7 @@
           <a:p>
             <a:fld id="{02DE1A39-6B7C-1C41-B748-86E8CB4FA6E7}" type="datetimeFigureOut">
               <a:rPr lang="en-US" smtClean="0"/>
-              <a:t>3/18/25</a:t>
+              <a:t>3/19/25</a:t>
             </a:fld>
             <a:endParaRPr lang="en-US"/>
           </a:p>
@@ -1142,7 +1142,7 @@
           <a:p>
             <a:fld id="{02DE1A39-6B7C-1C41-B748-86E8CB4FA6E7}" type="datetimeFigureOut">
               <a:rPr lang="en-US" smtClean="0"/>
-              <a:t>3/18/25</a:t>
+              <a:t>3/19/25</a:t>
             </a:fld>
             <a:endParaRPr lang="en-US"/>
           </a:p>
@@ -1407,7 +1407,7 @@
           <a:p>
             <a:fld id="{02DE1A39-6B7C-1C41-B748-86E8CB4FA6E7}" type="datetimeFigureOut">
               <a:rPr lang="en-US" smtClean="0"/>
-              <a:t>3/18/25</a:t>
+              <a:t>3/19/25</a:t>
             </a:fld>
             <a:endParaRPr lang="en-US"/>
           </a:p>
@@ -1819,7 +1819,7 @@
           <a:p>
             <a:fld id="{02DE1A39-6B7C-1C41-B748-86E8CB4FA6E7}" type="datetimeFigureOut">
               <a:rPr lang="en-US" smtClean="0"/>
-              <a:t>3/18/25</a:t>
+              <a:t>3/19/25</a:t>
             </a:fld>
             <a:endParaRPr lang="en-US"/>
           </a:p>
@@ -1960,7 +1960,7 @@
           <a:p>
             <a:fld id="{02DE1A39-6B7C-1C41-B748-86E8CB4FA6E7}" type="datetimeFigureOut">
               <a:rPr lang="en-US" smtClean="0"/>
-              <a:t>3/18/25</a:t>
+              <a:t>3/19/25</a:t>
             </a:fld>
             <a:endParaRPr lang="en-US"/>
           </a:p>
@@ -2073,7 +2073,7 @@
           <a:p>
             <a:fld id="{02DE1A39-6B7C-1C41-B748-86E8CB4FA6E7}" type="datetimeFigureOut">
               <a:rPr lang="en-US" smtClean="0"/>
-              <a:t>3/18/25</a:t>
+              <a:t>3/19/25</a:t>
             </a:fld>
             <a:endParaRPr lang="en-US"/>
           </a:p>
@@ -2384,7 +2384,7 @@
           <a:p>
             <a:fld id="{02DE1A39-6B7C-1C41-B748-86E8CB4FA6E7}" type="datetimeFigureOut">
               <a:rPr lang="en-US" smtClean="0"/>
-              <a:t>3/18/25</a:t>
+              <a:t>3/19/25</a:t>
             </a:fld>
             <a:endParaRPr lang="en-US"/>
           </a:p>
@@ -2672,7 +2672,7 @@
           <a:p>
             <a:fld id="{02DE1A39-6B7C-1C41-B748-86E8CB4FA6E7}" type="datetimeFigureOut">
               <a:rPr lang="en-US" smtClean="0"/>
-              <a:t>3/18/25</a:t>
+              <a:t>3/19/25</a:t>
             </a:fld>
             <a:endParaRPr lang="en-US"/>
           </a:p>
@@ -2913,7 +2913,7 @@
           <a:p>
             <a:fld id="{02DE1A39-6B7C-1C41-B748-86E8CB4FA6E7}" type="datetimeFigureOut">
               <a:rPr lang="en-US" smtClean="0"/>
-              <a:t>3/18/25</a:t>
+              <a:t>3/19/25</a:t>
             </a:fld>
             <a:endParaRPr lang="en-US"/>
           </a:p>
@@ -4373,7 +4373,7 @@
                     <a:schemeClr val="accent3"/>
                   </a:solidFill>
                 </a:rPr>
-                <a:t>min_angle: 9.97387</a:t>
+                <a:t> min_angle: 9.97387</a:t>
               </a:r>
             </a:p>
             <a:p>
@@ -4383,7 +4383,7 @@
                     <a:schemeClr val="accent3"/>
                   </a:solidFill>
                 </a:rPr>
-                <a:t>min_distance: 8.72605</a:t>
+                <a:t> min_distance: 8.72605</a:t>
               </a:r>
             </a:p>
             <a:p>
@@ -4537,7 +4537,7 @@
           </p:nvSpPr>
           <p:spPr>
             <a:xfrm>
-              <a:off x="5335397" y="2403836"/>
+              <a:off x="5400578" y="2403836"/>
               <a:ext cx="1555597" cy="388710"/>
             </a:xfrm>
             <a:prstGeom prst="roundRect">
@@ -4635,8 +4635,8 @@
           </p:nvSpPr>
           <p:spPr>
             <a:xfrm rot="10800000">
-              <a:off x="6956176" y="2518063"/>
-              <a:ext cx="348792" cy="160256"/>
+              <a:off x="7021354" y="2518063"/>
+              <a:ext cx="283613" cy="149636"/>
             </a:xfrm>
             <a:prstGeom prst="rightArrow">
               <a:avLst/>

</xml_diff>